<commit_message>
se sube rubrica del profe armando
</commit_message>
<xml_diff>
--- a/9°A/administracion_proyectos/Factores de Riesgo.pptx
+++ b/9°A/administracion_proyectos/Factores de Riesgo.pptx
@@ -113,6 +113,11 @@
       </a:defRPr>
     </a:lvl9pPr>
   </p:defaultTextStyle>
+  <p:extLst>
+    <p:ext uri="{EFAFB233-063F-42B5-8137-9DF3F51BA10A}">
+      <p15:sldGuideLst xmlns:p15="http://schemas.microsoft.com/office/powerpoint/2012/main"/>
+    </p:ext>
+  </p:extLst>
 </p:presentation>
 </file>
 
@@ -6165,11 +6170,7 @@
             </a:r>
             <a:r>
               <a:rPr lang="es-MX" dirty="0" smtClean="0"/>
-              <a:t>	</a:t>
-            </a:r>
-            <a:r>
-              <a:rPr lang="es-MX" dirty="0" smtClean="0"/>
-              <a:t>	091610050</a:t>
+              <a:t>		091610050</a:t>
             </a:r>
             <a:endParaRPr lang="es-MX" dirty="0"/>
           </a:p>
@@ -6410,7 +6411,6 @@
               <a:rPr lang="es-MX" dirty="0" smtClean="0"/>
               <a:t>riesgos de proyecto.</a:t>
             </a:r>
-            <a:endParaRPr lang="es-MX" dirty="0" smtClean="0"/>
           </a:p>
           <a:p>
             <a:pPr algn="just"/>
@@ -6628,7 +6628,7 @@
         </p:nvSpPr>
         <p:spPr>
           <a:xfrm>
-            <a:off x="1938664" y="2258022"/>
+            <a:off x="1938664" y="2276494"/>
             <a:ext cx="8321040" cy="3108543"/>
           </a:xfrm>
           <a:prstGeom prst="rect">
@@ -6645,7 +6645,11 @@
             <a:pPr algn="just"/>
             <a:r>
               <a:rPr lang="es-MX" sz="2800" dirty="0" smtClean="0"/>
-              <a:t>Encontrar los factores de  riegos es una parte importante en el desarrollo del proyecto, siendo un elemento clave en el procesos de toma de decisiones, para evitar el fracaso en el proyecto. Es necesario gestionar estos riesgos de manera inteligente para  que  esto se evite, o no afecten demasiad.</a:t>
+              <a:t>Encontrar los factores de  riegos es una parte importante en el desarrollo del proyecto, siendo un elemento clave en el procesos de toma de decisiones, para evitar el fracaso en el proyecto. Es necesario gestionar estos riesgos de manera inteligente para  que  esto se evite, o no afecten </a:t>
+            </a:r>
+            <a:r>
+              <a:rPr lang="es-MX" sz="2800" dirty="0" smtClean="0"/>
+              <a:t>demasiado.</a:t>
             </a:r>
             <a:endParaRPr lang="es-MX" sz="2800" dirty="0"/>
           </a:p>
@@ -6704,10 +6708,10 @@
           <a:lstStyle/>
           <a:p>
             <a:r>
-              <a:rPr lang="es-MX" sz="6000" b="1" dirty="0" err="1" smtClean="0">
+              <a:rPr lang="es-MX" sz="6000" b="1" dirty="0" smtClean="0">
                 <a:latin typeface="Arial Black" panose="020B0A04020102020204" pitchFamily="34" charset="0"/>
               </a:rPr>
-              <a:t>Guión</a:t>
+              <a:t>Guion</a:t>
             </a:r>
             <a:endParaRPr lang="es-MX" sz="6000" b="1" dirty="0">
               <a:latin typeface="Arial Black" panose="020B0A04020102020204" pitchFamily="34" charset="0"/>
@@ -7361,11 +7365,7 @@
             <a:pPr algn="just"/>
             <a:r>
               <a:rPr lang="es-MX" sz="2800" dirty="0" smtClean="0"/>
-              <a:t>Se identifico áreas donde  causa retras</a:t>
-            </a:r>
-            <a:r>
-              <a:rPr lang="es-MX" sz="2800" dirty="0" smtClean="0"/>
-              <a:t>o en el desarrollo del proyecto gracias al análisis de riesgos que se realizo, ahora se puede evitar de forma rápida  los problemas que sigua surgiendo.</a:t>
+              <a:t>Se identifico áreas donde  causa retraso en el desarrollo del proyecto gracias al análisis de riesgos que se realizo, ahora se puede evitar de forma rápida  los problemas que sigua surgiendo.</a:t>
             </a:r>
           </a:p>
           <a:p>

</xml_diff>

<commit_message>
se agrego descripcion a las deappositivas de gestion de riesgos
</commit_message>
<xml_diff>
--- a/9°A/administracion_proyectos/Factores de Riesgo.pptx
+++ b/9°A/administracion_proyectos/Factores de Riesgo.pptx
@@ -9,12 +9,16 @@
     <p:sldId id="258" r:id="rId3"/>
     <p:sldId id="259" r:id="rId4"/>
     <p:sldId id="264" r:id="rId5"/>
-    <p:sldId id="265" r:id="rId6"/>
-    <p:sldId id="266" r:id="rId7"/>
-    <p:sldId id="267" r:id="rId8"/>
-    <p:sldId id="268" r:id="rId9"/>
-    <p:sldId id="262" r:id="rId10"/>
-    <p:sldId id="263" r:id="rId11"/>
+    <p:sldId id="269" r:id="rId6"/>
+    <p:sldId id="265" r:id="rId7"/>
+    <p:sldId id="270" r:id="rId8"/>
+    <p:sldId id="266" r:id="rId9"/>
+    <p:sldId id="271" r:id="rId10"/>
+    <p:sldId id="267" r:id="rId11"/>
+    <p:sldId id="272" r:id="rId12"/>
+    <p:sldId id="268" r:id="rId13"/>
+    <p:sldId id="262" r:id="rId14"/>
+    <p:sldId id="263" r:id="rId15"/>
   </p:sldIdLst>
   <p:sldSz cx="12192000" cy="6858000"/>
   <p:notesSz cx="6858000" cy="9144000"/>
@@ -307,7 +311,7 @@
           <a:p>
             <a:fld id="{4A90D655-C9C7-4037-9323-9D48463D7117}" type="datetimeFigureOut">
               <a:rPr lang="es-MX" smtClean="0"/>
-              <a:t>09/07/2019</a:t>
+              <a:t>10/07/2019</a:t>
             </a:fld>
             <a:endParaRPr lang="es-MX"/>
           </a:p>
@@ -582,7 +586,7 @@
           <a:p>
             <a:fld id="{4A90D655-C9C7-4037-9323-9D48463D7117}" type="datetimeFigureOut">
               <a:rPr lang="es-MX" smtClean="0"/>
-              <a:t>09/07/2019</a:t>
+              <a:t>10/07/2019</a:t>
             </a:fld>
             <a:endParaRPr lang="es-MX"/>
           </a:p>
@@ -776,7 +780,7 @@
           <a:p>
             <a:fld id="{4A90D655-C9C7-4037-9323-9D48463D7117}" type="datetimeFigureOut">
               <a:rPr lang="es-MX" smtClean="0"/>
-              <a:t>09/07/2019</a:t>
+              <a:t>10/07/2019</a:t>
             </a:fld>
             <a:endParaRPr lang="es-MX"/>
           </a:p>
@@ -1049,7 +1053,7 @@
           <a:p>
             <a:fld id="{4A90D655-C9C7-4037-9323-9D48463D7117}" type="datetimeFigureOut">
               <a:rPr lang="es-MX" smtClean="0"/>
-              <a:t>09/07/2019</a:t>
+              <a:t>10/07/2019</a:t>
             </a:fld>
             <a:endParaRPr lang="es-MX"/>
           </a:p>
@@ -1390,7 +1394,7 @@
           <a:p>
             <a:fld id="{4A90D655-C9C7-4037-9323-9D48463D7117}" type="datetimeFigureOut">
               <a:rPr lang="es-MX" smtClean="0"/>
-              <a:t>09/07/2019</a:t>
+              <a:t>10/07/2019</a:t>
             </a:fld>
             <a:endParaRPr lang="es-MX"/>
           </a:p>
@@ -2013,7 +2017,7 @@
           <a:p>
             <a:fld id="{4A90D655-C9C7-4037-9323-9D48463D7117}" type="datetimeFigureOut">
               <a:rPr lang="es-MX" smtClean="0"/>
-              <a:t>09/07/2019</a:t>
+              <a:t>10/07/2019</a:t>
             </a:fld>
             <a:endParaRPr lang="es-MX"/>
           </a:p>
@@ -2873,7 +2877,7 @@
           <a:p>
             <a:fld id="{4A90D655-C9C7-4037-9323-9D48463D7117}" type="datetimeFigureOut">
               <a:rPr lang="es-MX" smtClean="0"/>
-              <a:t>09/07/2019</a:t>
+              <a:t>10/07/2019</a:t>
             </a:fld>
             <a:endParaRPr lang="es-MX"/>
           </a:p>
@@ -3043,7 +3047,7 @@
           <a:p>
             <a:fld id="{4A90D655-C9C7-4037-9323-9D48463D7117}" type="datetimeFigureOut">
               <a:rPr lang="es-MX" smtClean="0"/>
-              <a:t>09/07/2019</a:t>
+              <a:t>10/07/2019</a:t>
             </a:fld>
             <a:endParaRPr lang="es-MX"/>
           </a:p>
@@ -3223,7 +3227,7 @@
           <a:p>
             <a:fld id="{4A90D655-C9C7-4037-9323-9D48463D7117}" type="datetimeFigureOut">
               <a:rPr lang="es-MX" smtClean="0"/>
-              <a:t>09/07/2019</a:t>
+              <a:t>10/07/2019</a:t>
             </a:fld>
             <a:endParaRPr lang="es-MX"/>
           </a:p>
@@ -3393,7 +3397,7 @@
           <a:p>
             <a:fld id="{4A90D655-C9C7-4037-9323-9D48463D7117}" type="datetimeFigureOut">
               <a:rPr lang="es-MX" smtClean="0"/>
-              <a:t>09/07/2019</a:t>
+              <a:t>10/07/2019</a:t>
             </a:fld>
             <a:endParaRPr lang="es-MX"/>
           </a:p>
@@ -3640,7 +3644,7 @@
           <a:p>
             <a:fld id="{4A90D655-C9C7-4037-9323-9D48463D7117}" type="datetimeFigureOut">
               <a:rPr lang="es-MX" smtClean="0"/>
-              <a:t>09/07/2019</a:t>
+              <a:t>10/07/2019</a:t>
             </a:fld>
             <a:endParaRPr lang="es-MX"/>
           </a:p>
@@ -3932,7 +3936,7 @@
           <a:p>
             <a:fld id="{4A90D655-C9C7-4037-9323-9D48463D7117}" type="datetimeFigureOut">
               <a:rPr lang="es-MX" smtClean="0"/>
-              <a:t>09/07/2019</a:t>
+              <a:t>10/07/2019</a:t>
             </a:fld>
             <a:endParaRPr lang="es-MX"/>
           </a:p>
@@ -4376,7 +4380,7 @@
           <a:p>
             <a:fld id="{4A90D655-C9C7-4037-9323-9D48463D7117}" type="datetimeFigureOut">
               <a:rPr lang="es-MX" smtClean="0"/>
-              <a:t>09/07/2019</a:t>
+              <a:t>10/07/2019</a:t>
             </a:fld>
             <a:endParaRPr lang="es-MX"/>
           </a:p>
@@ -4494,7 +4498,7 @@
           <a:p>
             <a:fld id="{4A90D655-C9C7-4037-9323-9D48463D7117}" type="datetimeFigureOut">
               <a:rPr lang="es-MX" smtClean="0"/>
-              <a:t>09/07/2019</a:t>
+              <a:t>10/07/2019</a:t>
             </a:fld>
             <a:endParaRPr lang="es-MX"/>
           </a:p>
@@ -4589,7 +4593,7 @@
           <a:p>
             <a:fld id="{4A90D655-C9C7-4037-9323-9D48463D7117}" type="datetimeFigureOut">
               <a:rPr lang="es-MX" smtClean="0"/>
-              <a:t>09/07/2019</a:t>
+              <a:t>10/07/2019</a:t>
             </a:fld>
             <a:endParaRPr lang="es-MX"/>
           </a:p>
@@ -4868,7 +4872,7 @@
           <a:p>
             <a:fld id="{4A90D655-C9C7-4037-9323-9D48463D7117}" type="datetimeFigureOut">
               <a:rPr lang="es-MX" smtClean="0"/>
-              <a:t>09/07/2019</a:t>
+              <a:t>10/07/2019</a:t>
             </a:fld>
             <a:endParaRPr lang="es-MX"/>
           </a:p>
@@ -5143,7 +5147,7 @@
           <a:p>
             <a:fld id="{4A90D655-C9C7-4037-9323-9D48463D7117}" type="datetimeFigureOut">
               <a:rPr lang="es-MX" smtClean="0"/>
-              <a:t>09/07/2019</a:t>
+              <a:t>10/07/2019</a:t>
             </a:fld>
             <a:endParaRPr lang="es-MX"/>
           </a:p>
@@ -5572,7 +5576,7 @@
           <a:p>
             <a:fld id="{4A90D655-C9C7-4037-9323-9D48463D7117}" type="datetimeFigureOut">
               <a:rPr lang="es-MX" smtClean="0"/>
-              <a:t>09/07/2019</a:t>
+              <a:t>10/07/2019</a:t>
             </a:fld>
             <a:endParaRPr lang="es-MX"/>
           </a:p>
@@ -6458,6 +6462,444 @@
           <a:chExt cx="0" cy="0"/>
         </a:xfrm>
       </p:grpSpPr>
+      <p:pic>
+        <p:nvPicPr>
+          <p:cNvPr id="2" name="Imagen 1"/>
+          <p:cNvPicPr>
+            <a:picLocks noChangeAspect="1"/>
+          </p:cNvPicPr>
+          <p:nvPr/>
+        </p:nvPicPr>
+        <p:blipFill rotWithShape="1">
+          <a:blip r:embed="rId2"/>
+          <a:srcRect b="52435"/>
+          <a:stretch/>
+        </p:blipFill>
+        <p:spPr>
+          <a:xfrm>
+            <a:off x="914400" y="2129051"/>
+            <a:ext cx="10181229" cy="4663393"/>
+          </a:xfrm>
+          <a:prstGeom prst="rect">
+            <a:avLst/>
+          </a:prstGeom>
+        </p:spPr>
+      </p:pic>
+      <p:sp>
+        <p:nvSpPr>
+          <p:cNvPr id="3" name="CuadroTexto 2"/>
+          <p:cNvSpPr txBox="1"/>
+          <p:nvPr/>
+        </p:nvSpPr>
+        <p:spPr>
+          <a:xfrm>
+            <a:off x="1255595" y="93274"/>
+            <a:ext cx="9512489" cy="830997"/>
+          </a:xfrm>
+          <a:prstGeom prst="rect">
+            <a:avLst/>
+          </a:prstGeom>
+          <a:noFill/>
+        </p:spPr>
+        <p:txBody>
+          <a:bodyPr wrap="square" rtlCol="0">
+            <a:spAutoFit/>
+          </a:bodyPr>
+          <a:lstStyle/>
+          <a:p>
+            <a:pPr algn="ctr"/>
+            <a:r>
+              <a:rPr lang="es-MX" sz="4800" b="1" dirty="0" smtClean="0">
+                <a:latin typeface="Arial Black" panose="020B0A04020102020204" pitchFamily="34" charset="0"/>
+              </a:rPr>
+              <a:t>Plan de contingencia</a:t>
+            </a:r>
+            <a:endParaRPr lang="es-MX" sz="4800" b="1" dirty="0">
+              <a:latin typeface="Arial Black" panose="020B0A04020102020204" pitchFamily="34" charset="0"/>
+            </a:endParaRPr>
+          </a:p>
+        </p:txBody>
+      </p:sp>
+      <p:sp>
+        <p:nvSpPr>
+          <p:cNvPr id="4" name="CuadroTexto 3"/>
+          <p:cNvSpPr txBox="1"/>
+          <p:nvPr/>
+        </p:nvSpPr>
+        <p:spPr>
+          <a:xfrm>
+            <a:off x="661916" y="1131632"/>
+            <a:ext cx="10290412" cy="830997"/>
+          </a:xfrm>
+          <a:prstGeom prst="rect">
+            <a:avLst/>
+          </a:prstGeom>
+          <a:noFill/>
+        </p:spPr>
+        <p:txBody>
+          <a:bodyPr wrap="square" rtlCol="0">
+            <a:spAutoFit/>
+          </a:bodyPr>
+          <a:lstStyle/>
+          <a:p>
+            <a:r>
+              <a:rPr lang="es-MX" sz="2400" dirty="0" smtClean="0"/>
+              <a:t>Tabla que muestra datos para afrontar de manera adecuada ante algún problema que se presente.</a:t>
+            </a:r>
+            <a:endParaRPr lang="es-MX" sz="2400" dirty="0"/>
+          </a:p>
+        </p:txBody>
+      </p:sp>
+    </p:spTree>
+    <p:extLst>
+      <p:ext uri="{BB962C8B-B14F-4D97-AF65-F5344CB8AC3E}">
+        <p14:creationId xmlns:p14="http://schemas.microsoft.com/office/powerpoint/2010/main" val="3077770174"/>
+      </p:ext>
+    </p:extLst>
+  </p:cSld>
+  <p:clrMapOvr>
+    <a:masterClrMapping/>
+  </p:clrMapOvr>
+  <p:timing>
+    <p:tnLst>
+      <p:par>
+        <p:cTn id="1" dur="indefinite" restart="never" nodeType="tmRoot"/>
+      </p:par>
+    </p:tnLst>
+  </p:timing>
+</p:sld>
+</file>
+
+<file path=ppt/slides/slide11.xml><?xml version="1.0" encoding="utf-8"?>
+<p:sld xmlns:a="http://schemas.openxmlformats.org/drawingml/2006/main" xmlns:r="http://schemas.openxmlformats.org/officeDocument/2006/relationships" xmlns:p="http://schemas.openxmlformats.org/presentationml/2006/main">
+  <p:cSld>
+    <p:spTree>
+      <p:nvGrpSpPr>
+        <p:cNvPr id="1" name=""/>
+        <p:cNvGrpSpPr/>
+        <p:nvPr/>
+      </p:nvGrpSpPr>
+      <p:grpSpPr>
+        <a:xfrm>
+          <a:off x="0" y="0"/>
+          <a:ext cx="0" cy="0"/>
+          <a:chOff x="0" y="0"/>
+          <a:chExt cx="0" cy="0"/>
+        </a:xfrm>
+      </p:grpSpPr>
+      <p:pic>
+        <p:nvPicPr>
+          <p:cNvPr id="2" name="Imagen 1"/>
+          <p:cNvPicPr>
+            <a:picLocks noChangeAspect="1"/>
+          </p:cNvPicPr>
+          <p:nvPr/>
+        </p:nvPicPr>
+        <p:blipFill rotWithShape="1">
+          <a:blip r:embed="rId2"/>
+          <a:srcRect t="47565"/>
+          <a:stretch/>
+        </p:blipFill>
+        <p:spPr>
+          <a:xfrm>
+            <a:off x="1618865" y="1050879"/>
+            <a:ext cx="8999094" cy="5196084"/>
+          </a:xfrm>
+          <a:prstGeom prst="rect">
+            <a:avLst/>
+          </a:prstGeom>
+        </p:spPr>
+      </p:pic>
+    </p:spTree>
+    <p:extLst>
+      <p:ext uri="{BB962C8B-B14F-4D97-AF65-F5344CB8AC3E}">
+        <p14:creationId xmlns:p14="http://schemas.microsoft.com/office/powerpoint/2010/main" val="3787015765"/>
+      </p:ext>
+    </p:extLst>
+  </p:cSld>
+  <p:clrMapOvr>
+    <a:masterClrMapping/>
+  </p:clrMapOvr>
+</p:sld>
+</file>
+
+<file path=ppt/slides/slide12.xml><?xml version="1.0" encoding="utf-8"?>
+<p:sld xmlns:a="http://schemas.openxmlformats.org/drawingml/2006/main" xmlns:r="http://schemas.openxmlformats.org/officeDocument/2006/relationships" xmlns:p="http://schemas.openxmlformats.org/presentationml/2006/main">
+  <p:cSld>
+    <p:spTree>
+      <p:nvGrpSpPr>
+        <p:cNvPr id="1" name=""/>
+        <p:cNvGrpSpPr/>
+        <p:nvPr/>
+      </p:nvGrpSpPr>
+      <p:grpSpPr>
+        <a:xfrm>
+          <a:off x="0" y="0"/>
+          <a:ext cx="0" cy="0"/>
+          <a:chOff x="0" y="0"/>
+          <a:chExt cx="0" cy="0"/>
+        </a:xfrm>
+      </p:grpSpPr>
+      <p:pic>
+        <p:nvPicPr>
+          <p:cNvPr id="2" name="Imagen 1"/>
+          <p:cNvPicPr>
+            <a:picLocks noChangeAspect="1"/>
+          </p:cNvPicPr>
+          <p:nvPr/>
+        </p:nvPicPr>
+        <p:blipFill>
+          <a:blip r:embed="rId2"/>
+          <a:stretch>
+            <a:fillRect/>
+          </a:stretch>
+        </p:blipFill>
+        <p:spPr>
+          <a:xfrm>
+            <a:off x="5378070" y="2140507"/>
+            <a:ext cx="4284545" cy="4358417"/>
+          </a:xfrm>
+          <a:prstGeom prst="rect">
+            <a:avLst/>
+          </a:prstGeom>
+        </p:spPr>
+      </p:pic>
+      <p:sp>
+        <p:nvSpPr>
+          <p:cNvPr id="3" name="CuadroTexto 2"/>
+          <p:cNvSpPr txBox="1"/>
+          <p:nvPr/>
+        </p:nvSpPr>
+        <p:spPr>
+          <a:xfrm>
+            <a:off x="-445826" y="68240"/>
+            <a:ext cx="12637826" cy="1569660"/>
+          </a:xfrm>
+          <a:prstGeom prst="rect">
+            <a:avLst/>
+          </a:prstGeom>
+          <a:noFill/>
+        </p:spPr>
+        <p:txBody>
+          <a:bodyPr wrap="square" rtlCol="0">
+            <a:spAutoFit/>
+          </a:bodyPr>
+          <a:lstStyle/>
+          <a:p>
+            <a:pPr algn="ctr"/>
+            <a:r>
+              <a:rPr lang="es-MX" sz="4800" b="1" dirty="0" smtClean="0">
+                <a:latin typeface="Arial Black" panose="020B0A04020102020204" pitchFamily="34" charset="0"/>
+              </a:rPr>
+              <a:t>Gráfica </a:t>
+            </a:r>
+            <a:r>
+              <a:rPr lang="es-MX" sz="4800" b="1" dirty="0" smtClean="0">
+                <a:latin typeface="Arial Black" panose="020B0A04020102020204" pitchFamily="34" charset="0"/>
+              </a:rPr>
+              <a:t>de </a:t>
+            </a:r>
+            <a:endParaRPr lang="es-MX" sz="4800" b="1" dirty="0" smtClean="0">
+              <a:latin typeface="Arial Black" panose="020B0A04020102020204" pitchFamily="34" charset="0"/>
+            </a:endParaRPr>
+          </a:p>
+          <a:p>
+            <a:pPr algn="ctr"/>
+            <a:r>
+              <a:rPr lang="es-MX" sz="4800" b="1" dirty="0" smtClean="0">
+                <a:latin typeface="Arial Black" panose="020B0A04020102020204" pitchFamily="34" charset="0"/>
+              </a:rPr>
+              <a:t>probabilidad-impacto</a:t>
+            </a:r>
+            <a:endParaRPr lang="es-MX" sz="4800" b="1" dirty="0" smtClean="0">
+              <a:latin typeface="Arial Black" panose="020B0A04020102020204" pitchFamily="34" charset="0"/>
+            </a:endParaRPr>
+          </a:p>
+        </p:txBody>
+      </p:sp>
+      <p:sp>
+        <p:nvSpPr>
+          <p:cNvPr id="4" name="CuadroTexto 3"/>
+          <p:cNvSpPr txBox="1"/>
+          <p:nvPr/>
+        </p:nvSpPr>
+        <p:spPr>
+          <a:xfrm>
+            <a:off x="620972" y="2986668"/>
+            <a:ext cx="4223983" cy="1569660"/>
+          </a:xfrm>
+          <a:prstGeom prst="rect">
+            <a:avLst/>
+          </a:prstGeom>
+          <a:noFill/>
+        </p:spPr>
+        <p:txBody>
+          <a:bodyPr wrap="square" rtlCol="0">
+            <a:spAutoFit/>
+          </a:bodyPr>
+          <a:lstStyle/>
+          <a:p>
+            <a:r>
+              <a:rPr lang="es-MX" sz="2400" dirty="0" smtClean="0"/>
+              <a:t>La gráfica es el análisis cualitativo de riesgos que nos permiten establecer prioridades</a:t>
+            </a:r>
+            <a:endParaRPr lang="es-MX" sz="2400" dirty="0"/>
+          </a:p>
+        </p:txBody>
+      </p:sp>
+    </p:spTree>
+    <p:extLst>
+      <p:ext uri="{BB962C8B-B14F-4D97-AF65-F5344CB8AC3E}">
+        <p14:creationId xmlns:p14="http://schemas.microsoft.com/office/powerpoint/2010/main" val="103659686"/>
+      </p:ext>
+    </p:extLst>
+  </p:cSld>
+  <p:clrMapOvr>
+    <a:masterClrMapping/>
+  </p:clrMapOvr>
+  <p:timing>
+    <p:tnLst>
+      <p:par>
+        <p:cTn id="1" dur="indefinite" restart="never" nodeType="tmRoot"/>
+      </p:par>
+    </p:tnLst>
+  </p:timing>
+</p:sld>
+</file>
+
+<file path=ppt/slides/slide13.xml><?xml version="1.0" encoding="utf-8"?>
+<p:sld xmlns:a="http://schemas.openxmlformats.org/drawingml/2006/main" xmlns:r="http://schemas.openxmlformats.org/officeDocument/2006/relationships" xmlns:p="http://schemas.openxmlformats.org/presentationml/2006/main">
+  <p:cSld>
+    <p:spTree>
+      <p:nvGrpSpPr>
+        <p:cNvPr id="1" name=""/>
+        <p:cNvGrpSpPr/>
+        <p:nvPr/>
+      </p:nvGrpSpPr>
+      <p:grpSpPr>
+        <a:xfrm>
+          <a:off x="0" y="0"/>
+          <a:ext cx="0" cy="0"/>
+          <a:chOff x="0" y="0"/>
+          <a:chExt cx="0" cy="0"/>
+        </a:xfrm>
+      </p:grpSpPr>
+      <p:sp>
+        <p:nvSpPr>
+          <p:cNvPr id="2" name="CuadroTexto 1"/>
+          <p:cNvSpPr txBox="1"/>
+          <p:nvPr/>
+        </p:nvSpPr>
+        <p:spPr>
+          <a:xfrm>
+            <a:off x="3302757" y="423080"/>
+            <a:ext cx="4858604" cy="1015663"/>
+          </a:xfrm>
+          <a:prstGeom prst="rect">
+            <a:avLst/>
+          </a:prstGeom>
+          <a:noFill/>
+        </p:spPr>
+        <p:txBody>
+          <a:bodyPr wrap="square" rtlCol="0">
+            <a:spAutoFit/>
+          </a:bodyPr>
+          <a:lstStyle/>
+          <a:p>
+            <a:r>
+              <a:rPr lang="es-MX" sz="6000" b="1" dirty="0" smtClean="0">
+                <a:latin typeface="Arial Black" panose="020B0A04020102020204" pitchFamily="34" charset="0"/>
+              </a:rPr>
+              <a:t>Conclusión</a:t>
+            </a:r>
+            <a:endParaRPr lang="es-MX" sz="6000" b="1" dirty="0">
+              <a:latin typeface="Arial Black" panose="020B0A04020102020204" pitchFamily="34" charset="0"/>
+            </a:endParaRPr>
+          </a:p>
+        </p:txBody>
+      </p:sp>
+      <p:sp>
+        <p:nvSpPr>
+          <p:cNvPr id="3" name="CuadroTexto 2"/>
+          <p:cNvSpPr txBox="1"/>
+          <p:nvPr/>
+        </p:nvSpPr>
+        <p:spPr>
+          <a:xfrm>
+            <a:off x="1938664" y="2258022"/>
+            <a:ext cx="8321040" cy="3108543"/>
+          </a:xfrm>
+          <a:prstGeom prst="rect">
+            <a:avLst/>
+          </a:prstGeom>
+          <a:noFill/>
+        </p:spPr>
+        <p:txBody>
+          <a:bodyPr wrap="square" rtlCol="0">
+            <a:spAutoFit/>
+          </a:bodyPr>
+          <a:lstStyle/>
+          <a:p>
+            <a:pPr algn="just"/>
+            <a:r>
+              <a:rPr lang="es-MX" sz="2800" dirty="0" smtClean="0"/>
+              <a:t>Se identifico áreas donde  causa retraso en el desarrollo del proyecto gracias al análisis de riesgos que se </a:t>
+            </a:r>
+            <a:r>
+              <a:rPr lang="es-MX" sz="2800" dirty="0" smtClean="0"/>
+              <a:t>realizo y a la gráfica, </a:t>
+            </a:r>
+            <a:r>
+              <a:rPr lang="es-MX" sz="2800" dirty="0" smtClean="0"/>
+              <a:t>ahora se puede evitar de forma rápida  los problemas que sigua surgiendo.</a:t>
+            </a:r>
+          </a:p>
+          <a:p>
+            <a:pPr algn="just"/>
+            <a:r>
+              <a:rPr lang="es-MX" sz="2800" dirty="0" smtClean="0"/>
+              <a:t>Es importante realizar esto antes de iniciar un proyecto ya que ayuda a evitar retrasos.</a:t>
+            </a:r>
+          </a:p>
+        </p:txBody>
+      </p:sp>
+    </p:spTree>
+    <p:extLst>
+      <p:ext uri="{BB962C8B-B14F-4D97-AF65-F5344CB8AC3E}">
+        <p14:creationId xmlns:p14="http://schemas.microsoft.com/office/powerpoint/2010/main" val="2061665550"/>
+      </p:ext>
+    </p:extLst>
+  </p:cSld>
+  <p:clrMapOvr>
+    <a:masterClrMapping/>
+  </p:clrMapOvr>
+  <p:timing>
+    <p:tnLst>
+      <p:par>
+        <p:cTn id="1" dur="indefinite" restart="never" nodeType="tmRoot"/>
+      </p:par>
+    </p:tnLst>
+  </p:timing>
+</p:sld>
+</file>
+
+<file path=ppt/slides/slide14.xml><?xml version="1.0" encoding="utf-8"?>
+<p:sld xmlns:a="http://schemas.openxmlformats.org/drawingml/2006/main" xmlns:r="http://schemas.openxmlformats.org/officeDocument/2006/relationships" xmlns:p="http://schemas.openxmlformats.org/presentationml/2006/main">
+  <p:cSld>
+    <p:spTree>
+      <p:nvGrpSpPr>
+        <p:cNvPr id="1" name=""/>
+        <p:cNvGrpSpPr/>
+        <p:nvPr/>
+      </p:nvGrpSpPr>
+      <p:grpSpPr>
+        <a:xfrm>
+          <a:off x="0" y="0"/>
+          <a:ext cx="0" cy="0"/>
+          <a:chOff x="0" y="0"/>
+          <a:chExt cx="0" cy="0"/>
+        </a:xfrm>
+      </p:grpSpPr>
       <p:sp>
         <p:nvSpPr>
           <p:cNvPr id="2" name="CuadroTexto 1"/>
@@ -6628,7 +7070,7 @@
         </p:nvSpPr>
         <p:spPr>
           <a:xfrm>
-            <a:off x="1938664" y="2276494"/>
+            <a:off x="1938664" y="2258022"/>
             <a:ext cx="8321040" cy="3108543"/>
           </a:xfrm>
           <a:prstGeom prst="rect">
@@ -6645,11 +7087,7 @@
             <a:pPr algn="just"/>
             <a:r>
               <a:rPr lang="es-MX" sz="2800" dirty="0" smtClean="0"/>
-              <a:t>Encontrar los factores de  riegos es una parte importante en el desarrollo del proyecto, siendo un elemento clave en el procesos de toma de decisiones, para evitar el fracaso en el proyecto. Es necesario gestionar estos riesgos de manera inteligente para  que  esto se evite, o no afecten </a:t>
-            </a:r>
-            <a:r>
-              <a:rPr lang="es-MX" sz="2800" dirty="0" smtClean="0"/>
-              <a:t>demasiado.</a:t>
+              <a:t>Encontrar los factores de  riegos es una parte importante en el desarrollo del proyecto, siendo un elemento clave en el procesos de toma de decisiones, para evitar el fracaso en el proyecto. Es necesario gestionar estos riesgos de manera inteligente para  que  esto se evite, o no afecten demasiad.</a:t>
             </a:r>
             <a:endParaRPr lang="es-MX" sz="2800" dirty="0"/>
           </a:p>
@@ -6708,10 +7146,10 @@
           <a:lstStyle/>
           <a:p>
             <a:r>
-              <a:rPr lang="es-MX" sz="6000" b="1" dirty="0" smtClean="0">
+              <a:rPr lang="es-MX" sz="6000" b="1" dirty="0" err="1" smtClean="0">
                 <a:latin typeface="Arial Black" panose="020B0A04020102020204" pitchFamily="34" charset="0"/>
               </a:rPr>
-              <a:t>Guion</a:t>
+              <a:t>Guión</a:t>
             </a:r>
             <a:endParaRPr lang="es-MX" sz="6000" b="1" dirty="0">
               <a:latin typeface="Arial Black" panose="020B0A04020102020204" pitchFamily="34" charset="0"/>
@@ -6727,7 +7165,7 @@
         </p:nvSpPr>
         <p:spPr>
           <a:xfrm>
-            <a:off x="1938663" y="2258022"/>
+            <a:off x="1815834" y="2667455"/>
             <a:ext cx="9211557" cy="2246769"/>
           </a:xfrm>
           <a:prstGeom prst="rect">
@@ -6838,16 +7276,15 @@
           </p:cNvPicPr>
           <p:nvPr/>
         </p:nvPicPr>
-        <p:blipFill>
+        <p:blipFill rotWithShape="1">
           <a:blip r:embed="rId2"/>
-          <a:stretch>
-            <a:fillRect/>
-          </a:stretch>
+          <a:srcRect t="3710" b="48617"/>
+          <a:stretch/>
         </p:blipFill>
         <p:spPr>
           <a:xfrm>
-            <a:off x="3495473" y="1533657"/>
-            <a:ext cx="7975676" cy="5000623"/>
+            <a:off x="165418" y="2620370"/>
+            <a:ext cx="11843753" cy="4135271"/>
           </a:xfrm>
           <a:prstGeom prst="rect">
             <a:avLst/>
@@ -6862,7 +7299,7 @@
         </p:nvSpPr>
         <p:spPr>
           <a:xfrm>
-            <a:off x="2497541" y="382137"/>
+            <a:off x="2497541" y="234876"/>
             <a:ext cx="7588154" cy="1015663"/>
           </a:xfrm>
           <a:prstGeom prst="rect">
@@ -6885,6 +7322,36 @@
             <a:endParaRPr lang="es-MX" sz="6000" b="1" dirty="0">
               <a:latin typeface="Arial Black" panose="020B0A04020102020204" pitchFamily="34" charset="0"/>
             </a:endParaRPr>
+          </a:p>
+        </p:txBody>
+      </p:sp>
+      <p:sp>
+        <p:nvSpPr>
+          <p:cNvPr id="4" name="CuadroTexto 3"/>
+          <p:cNvSpPr txBox="1"/>
+          <p:nvPr/>
+        </p:nvSpPr>
+        <p:spPr>
+          <a:xfrm>
+            <a:off x="165418" y="1335290"/>
+            <a:ext cx="10290412" cy="1200329"/>
+          </a:xfrm>
+          <a:prstGeom prst="rect">
+            <a:avLst/>
+          </a:prstGeom>
+          <a:noFill/>
+        </p:spPr>
+        <p:txBody>
+          <a:bodyPr wrap="square" rtlCol="0">
+            <a:spAutoFit/>
+          </a:bodyPr>
+          <a:lstStyle/>
+          <a:p>
+            <a:r>
+              <a:rPr lang="es-MX" sz="2400" dirty="0" smtClean="0"/>
+              <a:t>Tabla que muestra el riesgo que ocurrió o que puede ocurrir, la cual se pudieron localizar seis actividades que pueda afectar al desarrollo de proyecto.</a:t>
+            </a:r>
+            <a:endParaRPr lang="es-MX" sz="2400" dirty="0"/>
           </a:p>
         </p:txBody>
       </p:sp>
@@ -6925,59 +7392,23 @@
           <a:chExt cx="0" cy="0"/>
         </a:xfrm>
       </p:grpSpPr>
-      <p:sp>
-        <p:nvSpPr>
-          <p:cNvPr id="2" name="CuadroTexto 1"/>
-          <p:cNvSpPr txBox="1"/>
-          <p:nvPr/>
-        </p:nvSpPr>
-        <p:spPr>
-          <a:xfrm>
-            <a:off x="1296538" y="504966"/>
-            <a:ext cx="9512489" cy="1569660"/>
-          </a:xfrm>
-          <a:prstGeom prst="rect">
-            <a:avLst/>
-          </a:prstGeom>
-          <a:noFill/>
-        </p:spPr>
-        <p:txBody>
-          <a:bodyPr wrap="square" rtlCol="0">
-            <a:spAutoFit/>
-          </a:bodyPr>
-          <a:lstStyle/>
-          <a:p>
-            <a:pPr algn="ctr"/>
-            <a:r>
-              <a:rPr lang="es-MX" sz="4800" b="1" dirty="0" smtClean="0">
-                <a:latin typeface="Arial Black" panose="020B0A04020102020204" pitchFamily="34" charset="0"/>
-              </a:rPr>
-              <a:t>Identificación y evaluación cualitativo de riesgos </a:t>
-            </a:r>
-            <a:endParaRPr lang="es-MX" sz="4800" b="1" dirty="0">
-              <a:latin typeface="Arial Black" panose="020B0A04020102020204" pitchFamily="34" charset="0"/>
-            </a:endParaRPr>
-          </a:p>
-        </p:txBody>
-      </p:sp>
       <p:pic>
         <p:nvPicPr>
-          <p:cNvPr id="3" name="Imagen 2"/>
+          <p:cNvPr id="2" name="Imagen 1"/>
           <p:cNvPicPr>
             <a:picLocks noChangeAspect="1"/>
           </p:cNvPicPr>
           <p:nvPr/>
         </p:nvPicPr>
-        <p:blipFill>
+        <p:blipFill rotWithShape="1">
           <a:blip r:embed="rId2"/>
-          <a:stretch>
-            <a:fillRect/>
-          </a:stretch>
+          <a:srcRect t="50934"/>
+          <a:stretch/>
         </p:blipFill>
         <p:spPr>
           <a:xfrm>
-            <a:off x="3647747" y="2074626"/>
-            <a:ext cx="4810070" cy="4743477"/>
+            <a:off x="341194" y="1364776"/>
+            <a:ext cx="11609937" cy="4901378"/>
           </a:xfrm>
           <a:prstGeom prst="rect">
             <a:avLst/>
@@ -6987,7 +7418,7 @@
     </p:spTree>
     <p:extLst>
       <p:ext uri="{BB962C8B-B14F-4D97-AF65-F5344CB8AC3E}">
-        <p14:creationId xmlns:p14="http://schemas.microsoft.com/office/powerpoint/2010/main" val="2119029928"/>
+        <p14:creationId xmlns:p14="http://schemas.microsoft.com/office/powerpoint/2010/main" val="3143529158"/>
       </p:ext>
     </p:extLst>
   </p:cSld>
@@ -7021,6 +7452,41 @@
           <a:chExt cx="0" cy="0"/>
         </a:xfrm>
       </p:grpSpPr>
+      <p:sp>
+        <p:nvSpPr>
+          <p:cNvPr id="2" name="CuadroTexto 1"/>
+          <p:cNvSpPr txBox="1"/>
+          <p:nvPr/>
+        </p:nvSpPr>
+        <p:spPr>
+          <a:xfrm>
+            <a:off x="1282890" y="0"/>
+            <a:ext cx="9512489" cy="1569660"/>
+          </a:xfrm>
+          <a:prstGeom prst="rect">
+            <a:avLst/>
+          </a:prstGeom>
+          <a:noFill/>
+        </p:spPr>
+        <p:txBody>
+          <a:bodyPr wrap="square" rtlCol="0">
+            <a:spAutoFit/>
+          </a:bodyPr>
+          <a:lstStyle/>
+          <a:p>
+            <a:pPr algn="ctr"/>
+            <a:r>
+              <a:rPr lang="es-MX" sz="4800" b="1" dirty="0" smtClean="0">
+                <a:latin typeface="Arial Black" panose="020B0A04020102020204" pitchFamily="34" charset="0"/>
+              </a:rPr>
+              <a:t>Identificación y evaluación cualitativo de riesgos </a:t>
+            </a:r>
+            <a:endParaRPr lang="es-MX" sz="4800" b="1" dirty="0">
+              <a:latin typeface="Arial Black" panose="020B0A04020102020204" pitchFamily="34" charset="0"/>
+            </a:endParaRPr>
+          </a:p>
+        </p:txBody>
+      </p:sp>
       <p:pic>
         <p:nvPicPr>
           <p:cNvPr id="3" name="Imagen 2"/>
@@ -7029,16 +7495,15 @@
           </p:cNvPicPr>
           <p:nvPr/>
         </p:nvPicPr>
-        <p:blipFill>
+        <p:blipFill rotWithShape="1">
           <a:blip r:embed="rId2"/>
-          <a:stretch>
-            <a:fillRect/>
-          </a:stretch>
+          <a:srcRect b="47064"/>
+          <a:stretch/>
         </p:blipFill>
         <p:spPr>
           <a:xfrm>
-            <a:off x="3507475" y="1271748"/>
-            <a:ext cx="4278908" cy="5299649"/>
+            <a:off x="655093" y="2893328"/>
+            <a:ext cx="11027390" cy="3774089"/>
           </a:xfrm>
           <a:prstGeom prst="rect">
             <a:avLst/>
@@ -7053,8 +7518,8 @@
         </p:nvSpPr>
         <p:spPr>
           <a:xfrm>
-            <a:off x="1255595" y="93274"/>
-            <a:ext cx="9512489" cy="830997"/>
+            <a:off x="893928" y="1815995"/>
+            <a:ext cx="10290412" cy="830997"/>
           </a:xfrm>
           <a:prstGeom prst="rect">
             <a:avLst/>
@@ -7067,23 +7532,18 @@
           </a:bodyPr>
           <a:lstStyle/>
           <a:p>
-            <a:pPr algn="ctr"/>
-            <a:r>
-              <a:rPr lang="es-MX" sz="4800" b="1" dirty="0" smtClean="0">
-                <a:latin typeface="Arial Black" panose="020B0A04020102020204" pitchFamily="34" charset="0"/>
-              </a:rPr>
-              <a:t>Plan de respuesta a riesgos</a:t>
-            </a:r>
-            <a:endParaRPr lang="es-MX" sz="4800" b="1" dirty="0">
-              <a:latin typeface="Arial Black" panose="020B0A04020102020204" pitchFamily="34" charset="0"/>
-            </a:endParaRPr>
+            <a:r>
+              <a:rPr lang="es-MX" sz="2400" dirty="0" smtClean="0"/>
+              <a:t>Tabla que muestra la causa del problema y el riesgo que podría ser si esto sucediera</a:t>
+            </a:r>
+            <a:endParaRPr lang="es-MX" sz="2400" dirty="0"/>
           </a:p>
         </p:txBody>
       </p:sp>
     </p:spTree>
     <p:extLst>
       <p:ext uri="{BB962C8B-B14F-4D97-AF65-F5344CB8AC3E}">
-        <p14:creationId xmlns:p14="http://schemas.microsoft.com/office/powerpoint/2010/main" val="341608988"/>
+        <p14:creationId xmlns:p14="http://schemas.microsoft.com/office/powerpoint/2010/main" val="2119029928"/>
       </p:ext>
     </p:extLst>
   </p:cSld>
@@ -7125,74 +7585,31 @@
           </p:cNvPicPr>
           <p:nvPr/>
         </p:nvPicPr>
-        <p:blipFill>
+        <p:blipFill rotWithShape="1">
           <a:blip r:embed="rId2"/>
-          <a:stretch>
-            <a:fillRect/>
-          </a:stretch>
+          <a:srcRect t="53512"/>
+          <a:stretch/>
         </p:blipFill>
         <p:spPr>
           <a:xfrm>
-            <a:off x="3590497" y="1216699"/>
-            <a:ext cx="4842683" cy="5332604"/>
+            <a:off x="584520" y="1596788"/>
+            <a:ext cx="10865898" cy="4981433"/>
           </a:xfrm>
           <a:prstGeom prst="rect">
             <a:avLst/>
           </a:prstGeom>
         </p:spPr>
       </p:pic>
-      <p:sp>
-        <p:nvSpPr>
-          <p:cNvPr id="3" name="CuadroTexto 2"/>
-          <p:cNvSpPr txBox="1"/>
-          <p:nvPr/>
-        </p:nvSpPr>
-        <p:spPr>
-          <a:xfrm>
-            <a:off x="1255595" y="93274"/>
-            <a:ext cx="9512489" cy="830997"/>
-          </a:xfrm>
-          <a:prstGeom prst="rect">
-            <a:avLst/>
-          </a:prstGeom>
-          <a:noFill/>
-        </p:spPr>
-        <p:txBody>
-          <a:bodyPr wrap="square" rtlCol="0">
-            <a:spAutoFit/>
-          </a:bodyPr>
-          <a:lstStyle/>
-          <a:p>
-            <a:pPr algn="ctr"/>
-            <a:r>
-              <a:rPr lang="es-MX" sz="4800" b="1" dirty="0" smtClean="0">
-                <a:latin typeface="Arial Black" panose="020B0A04020102020204" pitchFamily="34" charset="0"/>
-              </a:rPr>
-              <a:t>Plan de contingencia</a:t>
-            </a:r>
-            <a:endParaRPr lang="es-MX" sz="4800" b="1" dirty="0">
-              <a:latin typeface="Arial Black" panose="020B0A04020102020204" pitchFamily="34" charset="0"/>
-            </a:endParaRPr>
-          </a:p>
-        </p:txBody>
-      </p:sp>
     </p:spTree>
     <p:extLst>
       <p:ext uri="{BB962C8B-B14F-4D97-AF65-F5344CB8AC3E}">
-        <p14:creationId xmlns:p14="http://schemas.microsoft.com/office/powerpoint/2010/main" val="3077770174"/>
+        <p14:creationId xmlns:p14="http://schemas.microsoft.com/office/powerpoint/2010/main" val="4149977416"/>
       </p:ext>
     </p:extLst>
   </p:cSld>
   <p:clrMapOvr>
     <a:masterClrMapping/>
   </p:clrMapOvr>
-  <p:timing>
-    <p:tnLst>
-      <p:par>
-        <p:cTn id="1" dur="indefinite" restart="never" nodeType="tmRoot"/>
-      </p:par>
-    </p:tnLst>
-  </p:timing>
 </p:sld>
 </file>
 
@@ -7215,22 +7632,21 @@
       </p:grpSpPr>
       <p:pic>
         <p:nvPicPr>
-          <p:cNvPr id="2" name="Imagen 1"/>
+          <p:cNvPr id="3" name="Imagen 2"/>
           <p:cNvPicPr>
             <a:picLocks noChangeAspect="1"/>
           </p:cNvPicPr>
           <p:nvPr/>
         </p:nvPicPr>
-        <p:blipFill>
+        <p:blipFill rotWithShape="1">
           <a:blip r:embed="rId2"/>
-          <a:stretch>
-            <a:fillRect/>
-          </a:stretch>
+          <a:srcRect b="53693"/>
+          <a:stretch/>
         </p:blipFill>
         <p:spPr>
           <a:xfrm>
-            <a:off x="4354489" y="2384520"/>
-            <a:ext cx="3314700" cy="3371850"/>
+            <a:off x="245660" y="2265527"/>
+            <a:ext cx="11696131" cy="4411057"/>
           </a:xfrm>
           <a:prstGeom prst="rect">
             <a:avLst/>
@@ -7239,14 +7655,14 @@
       </p:pic>
       <p:sp>
         <p:nvSpPr>
-          <p:cNvPr id="3" name="CuadroTexto 2"/>
+          <p:cNvPr id="4" name="CuadroTexto 3"/>
           <p:cNvSpPr txBox="1"/>
           <p:nvPr/>
         </p:nvSpPr>
         <p:spPr>
           <a:xfrm>
-            <a:off x="1255595" y="93274"/>
-            <a:ext cx="9512489" cy="1569660"/>
+            <a:off x="1255595" y="-2262"/>
+            <a:ext cx="9512489" cy="830997"/>
           </a:xfrm>
           <a:prstGeom prst="rect">
             <a:avLst/>
@@ -7264,15 +7680,48 @@
               <a:rPr lang="es-MX" sz="4800" b="1" dirty="0" smtClean="0">
                 <a:latin typeface="Arial Black" panose="020B0A04020102020204" pitchFamily="34" charset="0"/>
               </a:rPr>
-              <a:t>Grafica de probabilidad e impacto</a:t>
-            </a:r>
+              <a:t>Plan de respuesta a riesgos</a:t>
+            </a:r>
+            <a:endParaRPr lang="es-MX" sz="4800" b="1" dirty="0">
+              <a:latin typeface="Arial Black" panose="020B0A04020102020204" pitchFamily="34" charset="0"/>
+            </a:endParaRPr>
+          </a:p>
+        </p:txBody>
+      </p:sp>
+      <p:sp>
+        <p:nvSpPr>
+          <p:cNvPr id="5" name="CuadroTexto 4"/>
+          <p:cNvSpPr txBox="1"/>
+          <p:nvPr/>
+        </p:nvSpPr>
+        <p:spPr>
+          <a:xfrm>
+            <a:off x="661916" y="1131632"/>
+            <a:ext cx="10290412" cy="830997"/>
+          </a:xfrm>
+          <a:prstGeom prst="rect">
+            <a:avLst/>
+          </a:prstGeom>
+          <a:noFill/>
+        </p:spPr>
+        <p:txBody>
+          <a:bodyPr wrap="square" rtlCol="0">
+            <a:spAutoFit/>
+          </a:bodyPr>
+          <a:lstStyle/>
+          <a:p>
+            <a:r>
+              <a:rPr lang="es-MX" sz="2400" dirty="0" smtClean="0"/>
+              <a:t>Tabla que muestra tipo de riesgo y quien es responsable de realizarla y de como se puede evitar con el pan de contingencia</a:t>
+            </a:r>
+            <a:endParaRPr lang="es-MX" sz="2400" dirty="0"/>
           </a:p>
         </p:txBody>
       </p:sp>
     </p:spTree>
     <p:extLst>
       <p:ext uri="{BB962C8B-B14F-4D97-AF65-F5344CB8AC3E}">
-        <p14:creationId xmlns:p14="http://schemas.microsoft.com/office/powerpoint/2010/main" val="103659686"/>
+        <p14:creationId xmlns:p14="http://schemas.microsoft.com/office/powerpoint/2010/main" val="341608988"/>
       </p:ext>
     </p:extLst>
   </p:cSld>
@@ -7306,94 +7755,39 @@
           <a:chExt cx="0" cy="0"/>
         </a:xfrm>
       </p:grpSpPr>
-      <p:sp>
-        <p:nvSpPr>
-          <p:cNvPr id="2" name="CuadroTexto 1"/>
-          <p:cNvSpPr txBox="1"/>
+      <p:pic>
+        <p:nvPicPr>
+          <p:cNvPr id="2" name="Imagen 1"/>
+          <p:cNvPicPr>
+            <a:picLocks noChangeAspect="1"/>
+          </p:cNvPicPr>
           <p:nvPr/>
-        </p:nvSpPr>
-        <p:spPr>
-          <a:xfrm>
-            <a:off x="3302757" y="423080"/>
-            <a:ext cx="4858604" cy="1015663"/>
+        </p:nvPicPr>
+        <p:blipFill rotWithShape="1">
+          <a:blip r:embed="rId2"/>
+          <a:srcRect t="46049" b="1"/>
+          <a:stretch/>
+        </p:blipFill>
+        <p:spPr>
+          <a:xfrm>
+            <a:off x="1658371" y="1214649"/>
+            <a:ext cx="8632040" cy="5056683"/>
           </a:xfrm>
           <a:prstGeom prst="rect">
             <a:avLst/>
           </a:prstGeom>
-          <a:noFill/>
-        </p:spPr>
-        <p:txBody>
-          <a:bodyPr wrap="square" rtlCol="0">
-            <a:spAutoFit/>
-          </a:bodyPr>
-          <a:lstStyle/>
-          <a:p>
-            <a:r>
-              <a:rPr lang="es-MX" sz="6000" b="1" dirty="0" smtClean="0">
-                <a:latin typeface="Arial Black" panose="020B0A04020102020204" pitchFamily="34" charset="0"/>
-              </a:rPr>
-              <a:t>Conclusión</a:t>
-            </a:r>
-            <a:endParaRPr lang="es-MX" sz="6000" b="1" dirty="0">
-              <a:latin typeface="Arial Black" panose="020B0A04020102020204" pitchFamily="34" charset="0"/>
-            </a:endParaRPr>
-          </a:p>
-        </p:txBody>
-      </p:sp>
-      <p:sp>
-        <p:nvSpPr>
-          <p:cNvPr id="3" name="CuadroTexto 2"/>
-          <p:cNvSpPr txBox="1"/>
-          <p:nvPr/>
-        </p:nvSpPr>
-        <p:spPr>
-          <a:xfrm>
-            <a:off x="1938664" y="2258022"/>
-            <a:ext cx="8321040" cy="3108543"/>
-          </a:xfrm>
-          <a:prstGeom prst="rect">
-            <a:avLst/>
-          </a:prstGeom>
-          <a:noFill/>
-        </p:spPr>
-        <p:txBody>
-          <a:bodyPr wrap="square" rtlCol="0">
-            <a:spAutoFit/>
-          </a:bodyPr>
-          <a:lstStyle/>
-          <a:p>
-            <a:pPr algn="just"/>
-            <a:r>
-              <a:rPr lang="es-MX" sz="2800" dirty="0" smtClean="0"/>
-              <a:t>Se identifico áreas donde  causa retraso en el desarrollo del proyecto gracias al análisis de riesgos que se realizo, ahora se puede evitar de forma rápida  los problemas que sigua surgiendo.</a:t>
-            </a:r>
-          </a:p>
-          <a:p>
-            <a:pPr algn="just"/>
-            <a:r>
-              <a:rPr lang="es-MX" sz="2800" dirty="0" smtClean="0"/>
-              <a:t>Es importante realizar esto antes de iniciar un proyecto ya que ayuda a evitar retrasos.</a:t>
-            </a:r>
-          </a:p>
-        </p:txBody>
-      </p:sp>
+        </p:spPr>
+      </p:pic>
     </p:spTree>
     <p:extLst>
       <p:ext uri="{BB962C8B-B14F-4D97-AF65-F5344CB8AC3E}">
-        <p14:creationId xmlns:p14="http://schemas.microsoft.com/office/powerpoint/2010/main" val="2061665550"/>
+        <p14:creationId xmlns:p14="http://schemas.microsoft.com/office/powerpoint/2010/main" val="596817801"/>
       </p:ext>
     </p:extLst>
   </p:cSld>
   <p:clrMapOvr>
     <a:masterClrMapping/>
   </p:clrMapOvr>
-  <p:timing>
-    <p:tnLst>
-      <p:par>
-        <p:cTn id="1" dur="indefinite" restart="never" nodeType="tmRoot"/>
-      </p:par>
-    </p:tnLst>
-  </p:timing>
 </p:sld>
 </file>
 

</xml_diff>